<commit_message>
PPT Final Presentación Avance
</commit_message>
<xml_diff>
--- a/proyecto MDD.pptx
+++ b/proyecto MDD.pptx
@@ -3953,7 +3953,7 @@
         </p:nvSpPr>
         <p:spPr>
           <a:xfrm flipH="false" flipV="false" rot="0">
-            <a:off x="3383777" y="5396472"/>
+            <a:off x="3383777" y="3520715"/>
             <a:ext cx="11520447" cy="3245569"/>
           </a:xfrm>
           <a:custGeom>
@@ -3971,10 +3971,10 @@
                   <a:pt x="11520446" y="0"/>
                 </a:lnTo>
                 <a:lnTo>
-                  <a:pt x="11520446" y="3245569"/>
-                </a:lnTo>
-                <a:lnTo>
-                  <a:pt x="0" y="3245569"/>
+                  <a:pt x="11520446" y="3245570"/>
+                </a:lnTo>
+                <a:lnTo>
+                  <a:pt x="0" y="3245570"/>
                 </a:lnTo>
                 <a:lnTo>
                   <a:pt x="0" y="0"/>
@@ -3999,8 +3999,8 @@
         </p:nvSpPr>
         <p:spPr>
           <a:xfrm flipH="false" flipV="false" rot="0">
-            <a:off x="3383777" y="2776133"/>
-            <a:ext cx="3290251" cy="5865908"/>
+            <a:off x="4336421" y="3520715"/>
+            <a:ext cx="1170517" cy="828071"/>
           </a:xfrm>
           <a:custGeom>
             <a:avLst/>
@@ -4009,18 +4009,18 @@
             <a:cxnLst/>
             <a:rect r="r" b="b" t="t" l="l"/>
             <a:pathLst>
-              <a:path h="5865908" w="3290251">
+              <a:path h="828071" w="1170517">
                 <a:moveTo>
                   <a:pt x="0" y="0"/>
                 </a:moveTo>
                 <a:lnTo>
-                  <a:pt x="3290250" y="0"/>
-                </a:lnTo>
-                <a:lnTo>
-                  <a:pt x="3290250" y="5865908"/>
-                </a:lnTo>
-                <a:lnTo>
-                  <a:pt x="0" y="5865908"/>
+                  <a:pt x="1170517" y="0"/>
+                </a:lnTo>
+                <a:lnTo>
+                  <a:pt x="1170517" y="828072"/>
+                </a:lnTo>
+                <a:lnTo>
+                  <a:pt x="0" y="828072"/>
                 </a:lnTo>
                 <a:lnTo>
                   <a:pt x="0" y="0"/>
@@ -4032,60 +4032,14 @@
           <a:blipFill>
             <a:blip r:embed="rId4"/>
             <a:stretch>
-              <a:fillRect l="0" t="-63829" r="-358876" b="0"/>
+              <a:fillRect l="-1085859" t="-1060537" r="-104013" b="0"/>
             </a:stretch>
           </a:blipFill>
         </p:spPr>
       </p:sp>
       <p:sp>
         <p:nvSpPr>
-          <p:cNvPr name="Freeform 6" id="6"/>
-          <p:cNvSpPr/>
-          <p:nvPr/>
-        </p:nvSpPr>
-        <p:spPr>
-          <a:xfrm flipH="false" flipV="false" rot="0">
-            <a:off x="5503511" y="2776133"/>
-            <a:ext cx="1170517" cy="1656142"/>
-          </a:xfrm>
-          <a:custGeom>
-            <a:avLst/>
-            <a:gdLst/>
-            <a:ahLst/>
-            <a:cxnLst/>
-            <a:rect r="r" b="b" t="t" l="l"/>
-            <a:pathLst>
-              <a:path h="1656142" w="1170517">
-                <a:moveTo>
-                  <a:pt x="0" y="0"/>
-                </a:moveTo>
-                <a:lnTo>
-                  <a:pt x="1170516" y="0"/>
-                </a:lnTo>
-                <a:lnTo>
-                  <a:pt x="1170516" y="1656142"/>
-                </a:lnTo>
-                <a:lnTo>
-                  <a:pt x="0" y="1656142"/>
-                </a:lnTo>
-                <a:lnTo>
-                  <a:pt x="0" y="0"/>
-                </a:lnTo>
-                <a:close/>
-              </a:path>
-            </a:pathLst>
-          </a:custGeom>
-          <a:blipFill>
-            <a:blip r:embed="rId4"/>
-            <a:stretch>
-              <a:fillRect l="-1085859" t="-480268" r="-104013" b="0"/>
-            </a:stretch>
-          </a:blipFill>
-        </p:spPr>
-      </p:sp>
-      <p:sp>
-        <p:nvSpPr>
-          <p:cNvPr name="TextBox 7" id="7"/>
+          <p:cNvPr name="TextBox 6" id="6"/>
           <p:cNvSpPr txBox="true"/>
           <p:nvPr/>
         </p:nvSpPr>
@@ -4123,6 +4077,52 @@
             </a:r>
           </a:p>
         </p:txBody>
+      </p:sp>
+      <p:sp>
+        <p:nvSpPr>
+          <p:cNvPr name="Freeform 7" id="7"/>
+          <p:cNvSpPr/>
+          <p:nvPr/>
+        </p:nvSpPr>
+        <p:spPr>
+          <a:xfrm flipH="false" flipV="false" rot="0">
+            <a:off x="3383777" y="6703528"/>
+            <a:ext cx="11520447" cy="351797"/>
+          </a:xfrm>
+          <a:custGeom>
+            <a:avLst/>
+            <a:gdLst/>
+            <a:ahLst/>
+            <a:cxnLst/>
+            <a:rect r="r" b="b" t="t" l="l"/>
+            <a:pathLst>
+              <a:path h="351797" w="11520447">
+                <a:moveTo>
+                  <a:pt x="0" y="0"/>
+                </a:moveTo>
+                <a:lnTo>
+                  <a:pt x="11520446" y="0"/>
+                </a:lnTo>
+                <a:lnTo>
+                  <a:pt x="11520446" y="351797"/>
+                </a:lnTo>
+                <a:lnTo>
+                  <a:pt x="0" y="351797"/>
+                </a:lnTo>
+                <a:lnTo>
+                  <a:pt x="0" y="0"/>
+                </a:lnTo>
+                <a:close/>
+              </a:path>
+            </a:pathLst>
+          </a:custGeom>
+          <a:blipFill>
+            <a:blip r:embed="rId4"/>
+            <a:stretch>
+              <a:fillRect l="-532247" t="-12579632" r="0" b="-498892"/>
+            </a:stretch>
+          </a:blipFill>
+        </p:spPr>
       </p:sp>
     </p:spTree>
   </p:cSld>

</xml_diff>